<commit_message>
updated documentatie, last push
</commit_message>
<xml_diff>
--- a/documentatie/prezentare.pptx
+++ b/documentatie/prezentare.pptx
@@ -5,7 +5,7 @@
     <p:sldMasterId id="2147483648" r:id="rId1"/>
   </p:sldMasterIdLst>
   <p:notesMasterIdLst>
-    <p:notesMasterId r:id="rId10"/>
+    <p:notesMasterId r:id="rId12"/>
   </p:notesMasterIdLst>
   <p:sldIdLst>
     <p:sldId id="256" r:id="rId2"/>
@@ -13,9 +13,11 @@
     <p:sldId id="258" r:id="rId4"/>
     <p:sldId id="261" r:id="rId5"/>
     <p:sldId id="259" r:id="rId6"/>
-    <p:sldId id="263" r:id="rId7"/>
-    <p:sldId id="262" r:id="rId8"/>
-    <p:sldId id="260" r:id="rId9"/>
+    <p:sldId id="264" r:id="rId7"/>
+    <p:sldId id="265" r:id="rId8"/>
+    <p:sldId id="263" r:id="rId9"/>
+    <p:sldId id="262" r:id="rId10"/>
+    <p:sldId id="260" r:id="rId11"/>
   </p:sldIdLst>
   <p:sldSz cx="12192000" cy="6858000"/>
   <p:notesSz cx="6858000" cy="9144000"/>
@@ -3923,6 +3925,73 @@
     <p:extLst>
       <p:ext uri="{BB962C8B-B14F-4D97-AF65-F5344CB8AC3E}">
         <p14:creationId xmlns:p14="http://schemas.microsoft.com/office/powerpoint/2010/main" val="3122299797"/>
+      </p:ext>
+    </p:extLst>
+  </p:cSld>
+  <p:clrMapOvr>
+    <a:masterClrMapping/>
+  </p:clrMapOvr>
+</p:sld>
+</file>
+
+<file path=ppt/slides/slide10.xml><?xml version="1.0" encoding="utf-8"?>
+<p:sld xmlns:a="http://schemas.openxmlformats.org/drawingml/2006/main" xmlns:r="http://schemas.openxmlformats.org/officeDocument/2006/relationships" xmlns:p="http://schemas.openxmlformats.org/presentationml/2006/main">
+  <p:cSld>
+    <p:spTree>
+      <p:nvGrpSpPr>
+        <p:cNvPr id="1" name=""/>
+        <p:cNvGrpSpPr/>
+        <p:nvPr/>
+      </p:nvGrpSpPr>
+      <p:grpSpPr>
+        <a:xfrm>
+          <a:off x="0" y="0"/>
+          <a:ext cx="0" cy="0"/>
+          <a:chOff x="0" y="0"/>
+          <a:chExt cx="0" cy="0"/>
+        </a:xfrm>
+      </p:grpSpPr>
+      <p:sp>
+        <p:nvSpPr>
+          <p:cNvPr id="7" name="Title 6">
+            <a:extLst>
+              <a:ext uri="{FF2B5EF4-FFF2-40B4-BE49-F238E27FC236}">
+                <a16:creationId xmlns:a16="http://schemas.microsoft.com/office/drawing/2014/main" xmlns="" id="{8AB8EB34-892F-4494-9C40-44F74E78102D}"/>
+              </a:ext>
+            </a:extLst>
+          </p:cNvPr>
+          <p:cNvSpPr>
+            <a:spLocks noGrp="1"/>
+          </p:cNvSpPr>
+          <p:nvPr>
+            <p:ph type="title"/>
+          </p:nvPr>
+        </p:nvSpPr>
+        <p:spPr>
+          <a:xfrm>
+            <a:off x="838200" y="2766218"/>
+            <a:ext cx="10515600" cy="1325563"/>
+          </a:xfrm>
+        </p:spPr>
+        <p:txBody>
+          <a:bodyPr>
+            <a:normAutofit/>
+          </a:bodyPr>
+          <a:lstStyle/>
+          <a:p>
+            <a:pPr algn="ctr"/>
+            <a:r>
+              <a:rPr lang="en-US" sz="6600" b="1" dirty="0" err="1"/>
+              <a:t>Exemple</a:t>
+            </a:r>
+            <a:endParaRPr lang="en-US" sz="6600" b="1" dirty="0"/>
+          </a:p>
+        </p:txBody>
+      </p:sp>
+    </p:spTree>
+    <p:extLst>
+      <p:ext uri="{BB962C8B-B14F-4D97-AF65-F5344CB8AC3E}">
+        <p14:creationId xmlns:p14="http://schemas.microsoft.com/office/powerpoint/2010/main" val="3897564382"/>
       </p:ext>
     </p:extLst>
   </p:cSld>
@@ -7258,7 +7327,12 @@
             <p:ph type="title"/>
           </p:nvPr>
         </p:nvSpPr>
-        <p:spPr/>
+        <p:spPr>
+          <a:xfrm>
+            <a:off x="846909" y="121285"/>
+            <a:ext cx="10515600" cy="1325563"/>
+          </a:xfrm>
+        </p:spPr>
         <p:txBody>
           <a:bodyPr/>
           <a:lstStyle/>
@@ -7266,220 +7340,830 @@
             <a:pPr algn="ctr"/>
             <a:r>
               <a:rPr lang="en-US" b="1" dirty="0" err="1" smtClean="0"/>
-              <a:t>Limitari</a:t>
+              <a:t>Independenta</a:t>
             </a:r>
             <a:r>
               <a:rPr lang="en-US" b="1" dirty="0" smtClean="0"/>
-              <a:t> ale ICA</a:t>
+              <a:t> </a:t>
+            </a:r>
+            <a:r>
+              <a:rPr lang="en-US" b="1" dirty="0" err="1" smtClean="0"/>
+              <a:t>si</a:t>
+            </a:r>
+            <a:r>
+              <a:rPr lang="en-US" b="1" dirty="0" smtClean="0"/>
+              <a:t> non-</a:t>
+            </a:r>
+            <a:r>
+              <a:rPr lang="en-US" b="1" dirty="0" err="1" smtClean="0"/>
+              <a:t>gaussianitate</a:t>
             </a:r>
             <a:endParaRPr lang="en-US" b="1" dirty="0"/>
           </a:p>
         </p:txBody>
       </p:sp>
+      <p:sp>
+        <p:nvSpPr>
+          <p:cNvPr id="3" name="Content Placeholder 2"/>
+          <p:cNvSpPr>
+            <a:spLocks noGrp="1"/>
+          </p:cNvSpPr>
+          <p:nvPr>
+            <p:ph idx="1"/>
+          </p:nvPr>
+        </p:nvSpPr>
+        <p:spPr>
+          <a:xfrm>
+            <a:off x="846909" y="1367246"/>
+            <a:ext cx="10515600" cy="4809717"/>
+          </a:xfrm>
+        </p:spPr>
+        <p:txBody>
+          <a:bodyPr/>
+          <a:lstStyle/>
+          <a:p>
+            <a:r>
+              <a:rPr lang="en-US" dirty="0" err="1" smtClean="0"/>
+              <a:t>Dupa</a:t>
+            </a:r>
+            <a:r>
+              <a:rPr lang="en-US" dirty="0" smtClean="0"/>
+              <a:t> cum am </a:t>
+            </a:r>
+            <a:r>
+              <a:rPr lang="en-US" dirty="0" err="1" smtClean="0"/>
+              <a:t>mentionat</a:t>
+            </a:r>
+            <a:r>
+              <a:rPr lang="en-US" dirty="0" smtClean="0"/>
+              <a:t> </a:t>
+            </a:r>
+            <a:r>
+              <a:rPr lang="en-US" dirty="0" err="1" smtClean="0"/>
+              <a:t>mai</a:t>
+            </a:r>
+            <a:r>
+              <a:rPr lang="en-US" dirty="0" smtClean="0"/>
+              <a:t> </a:t>
+            </a:r>
+            <a:r>
+              <a:rPr lang="en-US" dirty="0" err="1" smtClean="0"/>
+              <a:t>devreme</a:t>
+            </a:r>
+            <a:r>
+              <a:rPr lang="en-US" dirty="0" smtClean="0"/>
+              <a:t>, </a:t>
+            </a:r>
+            <a:r>
+              <a:rPr lang="en-US" dirty="0" err="1" smtClean="0"/>
+              <a:t>sursele</a:t>
+            </a:r>
+            <a:r>
+              <a:rPr lang="en-US" dirty="0" smtClean="0"/>
+              <a:t> </a:t>
+            </a:r>
+            <a:r>
+              <a:rPr lang="en-US" dirty="0" err="1" smtClean="0"/>
+              <a:t>initiale</a:t>
+            </a:r>
+            <a:r>
+              <a:rPr lang="en-US" dirty="0" smtClean="0"/>
+              <a:t> </a:t>
+            </a:r>
+            <a:r>
+              <a:rPr lang="en-US" dirty="0" err="1" smtClean="0"/>
+              <a:t>trebuie</a:t>
+            </a:r>
+            <a:r>
+              <a:rPr lang="en-US" dirty="0" smtClean="0"/>
+              <a:t> </a:t>
+            </a:r>
+            <a:r>
+              <a:rPr lang="en-US" dirty="0" err="1" smtClean="0"/>
+              <a:t>sa</a:t>
+            </a:r>
+            <a:r>
+              <a:rPr lang="en-US" dirty="0" smtClean="0"/>
+              <a:t> fie </a:t>
+            </a:r>
+            <a:r>
+              <a:rPr lang="en-US" dirty="0" err="1" smtClean="0"/>
+              <a:t>independente</a:t>
+            </a:r>
+            <a:r>
+              <a:rPr lang="en-US" dirty="0" smtClean="0"/>
+              <a:t>, </a:t>
+            </a:r>
+            <a:r>
+              <a:rPr lang="en-US" dirty="0" err="1" smtClean="0"/>
+              <a:t>asta</a:t>
+            </a:r>
+            <a:r>
+              <a:rPr lang="en-US" dirty="0" smtClean="0"/>
+              <a:t> </a:t>
+            </a:r>
+            <a:r>
+              <a:rPr lang="en-US" dirty="0" err="1" smtClean="0"/>
+              <a:t>deoarece</a:t>
+            </a:r>
+            <a:r>
+              <a:rPr lang="en-US" dirty="0" smtClean="0"/>
+              <a:t>, </a:t>
+            </a:r>
+            <a:r>
+              <a:rPr lang="en-US" dirty="0" err="1" smtClean="0"/>
+              <a:t>daca</a:t>
+            </a:r>
+            <a:r>
+              <a:rPr lang="en-US" dirty="0" smtClean="0"/>
+              <a:t> </a:t>
+            </a:r>
+            <a:r>
+              <a:rPr lang="en-US" dirty="0" err="1" smtClean="0"/>
+              <a:t>presupunem</a:t>
+            </a:r>
+            <a:r>
+              <a:rPr lang="en-US" dirty="0" smtClean="0"/>
+              <a:t> ca </a:t>
+            </a:r>
+            <a:r>
+              <a:rPr lang="en-US" dirty="0" err="1" smtClean="0"/>
+              <a:t>vrem</a:t>
+            </a:r>
+            <a:r>
+              <a:rPr lang="en-US" dirty="0" smtClean="0"/>
+              <a:t> </a:t>
+            </a:r>
+            <a:r>
+              <a:rPr lang="en-US" dirty="0" err="1" smtClean="0"/>
+              <a:t>sa</a:t>
+            </a:r>
+            <a:r>
+              <a:rPr lang="en-US" dirty="0" smtClean="0"/>
+              <a:t> </a:t>
+            </a:r>
+            <a:r>
+              <a:rPr lang="en-US" dirty="0" err="1" smtClean="0"/>
+              <a:t>calculam</a:t>
+            </a:r>
+            <a:r>
+              <a:rPr lang="en-US" dirty="0" smtClean="0"/>
+              <a:t> 2 </a:t>
+            </a:r>
+            <a:r>
+              <a:rPr lang="en-US" dirty="0" err="1" smtClean="0"/>
+              <a:t>componente</a:t>
+            </a:r>
+            <a:r>
+              <a:rPr lang="en-US" dirty="0" smtClean="0"/>
+              <a:t> </a:t>
+            </a:r>
+            <a:r>
+              <a:rPr lang="en-US" dirty="0" err="1" smtClean="0"/>
+              <a:t>independente</a:t>
+            </a:r>
+            <a:r>
+              <a:rPr lang="en-US" dirty="0" smtClean="0"/>
+              <a:t>, </a:t>
+            </a:r>
+            <a:r>
+              <a:rPr lang="en-US" dirty="0" err="1" smtClean="0"/>
+              <a:t>daca</a:t>
+            </a:r>
+            <a:r>
+              <a:rPr lang="en-US" dirty="0" smtClean="0"/>
+              <a:t> o </a:t>
+            </a:r>
+            <a:r>
+              <a:rPr lang="en-US" dirty="0" err="1" smtClean="0"/>
+              <a:t>sursa</a:t>
+            </a:r>
+            <a:r>
+              <a:rPr lang="en-US" dirty="0" smtClean="0"/>
+              <a:t> </a:t>
+            </a:r>
+            <a:r>
+              <a:rPr lang="en-US" dirty="0" err="1" smtClean="0"/>
+              <a:t>depinde</a:t>
+            </a:r>
+            <a:r>
+              <a:rPr lang="en-US" dirty="0" smtClean="0"/>
+              <a:t> de </a:t>
+            </a:r>
+            <a:r>
+              <a:rPr lang="en-US" dirty="0" err="1" smtClean="0"/>
+              <a:t>cealalta</a:t>
+            </a:r>
+            <a:r>
+              <a:rPr lang="en-US" dirty="0" smtClean="0"/>
+              <a:t>, </a:t>
+            </a:r>
+            <a:r>
+              <a:rPr lang="en-US" dirty="0" err="1" smtClean="0"/>
+              <a:t>inseamna</a:t>
+            </a:r>
+            <a:r>
+              <a:rPr lang="en-US" dirty="0" smtClean="0"/>
+              <a:t> ca </a:t>
+            </a:r>
+            <a:r>
+              <a:rPr lang="en-US" dirty="0" err="1" smtClean="0"/>
+              <a:t>sursa</a:t>
+            </a:r>
+            <a:r>
+              <a:rPr lang="en-US" dirty="0" smtClean="0"/>
+              <a:t> </a:t>
+            </a:r>
+            <a:r>
+              <a:rPr lang="en-US" dirty="0" err="1" smtClean="0"/>
+              <a:t>respectiva</a:t>
+            </a:r>
+            <a:r>
+              <a:rPr lang="en-US" dirty="0" smtClean="0"/>
+              <a:t> </a:t>
+            </a:r>
+            <a:r>
+              <a:rPr lang="en-US" dirty="0" err="1" smtClean="0"/>
+              <a:t>poate</a:t>
+            </a:r>
+            <a:r>
+              <a:rPr lang="en-US" dirty="0" smtClean="0"/>
+              <a:t> fi </a:t>
+            </a:r>
+            <a:r>
+              <a:rPr lang="en-US" dirty="0" err="1" smtClean="0"/>
+              <a:t>determinata</a:t>
+            </a:r>
+            <a:r>
+              <a:rPr lang="en-US" dirty="0" smtClean="0"/>
+              <a:t> </a:t>
+            </a:r>
+            <a:r>
+              <a:rPr lang="en-US" dirty="0" err="1" smtClean="0"/>
+              <a:t>prin</a:t>
+            </a:r>
+            <a:r>
+              <a:rPr lang="en-US" dirty="0" smtClean="0"/>
+              <a:t> </a:t>
+            </a:r>
+            <a:r>
+              <a:rPr lang="en-US" dirty="0" err="1" smtClean="0"/>
+              <a:t>operatii</a:t>
+            </a:r>
+            <a:r>
+              <a:rPr lang="en-US" dirty="0" smtClean="0"/>
+              <a:t> </a:t>
+            </a:r>
+            <a:r>
+              <a:rPr lang="en-US" dirty="0" err="1" smtClean="0"/>
+              <a:t>liniare</a:t>
+            </a:r>
+            <a:r>
+              <a:rPr lang="en-US" dirty="0" smtClean="0"/>
+              <a:t> </a:t>
+            </a:r>
+            <a:r>
+              <a:rPr lang="en-US" dirty="0" err="1" smtClean="0"/>
+              <a:t>efectuate</a:t>
+            </a:r>
+            <a:r>
+              <a:rPr lang="en-US" dirty="0" smtClean="0"/>
+              <a:t> </a:t>
+            </a:r>
+            <a:r>
+              <a:rPr lang="en-US" dirty="0" err="1" smtClean="0"/>
+              <a:t>asupra</a:t>
+            </a:r>
+            <a:r>
+              <a:rPr lang="en-US" dirty="0" smtClean="0"/>
+              <a:t> </a:t>
+            </a:r>
+            <a:r>
+              <a:rPr lang="en-US" dirty="0" err="1" smtClean="0"/>
+              <a:t>celeilalte</a:t>
+            </a:r>
+            <a:r>
+              <a:rPr lang="en-US" dirty="0" smtClean="0"/>
+              <a:t> </a:t>
+            </a:r>
+            <a:r>
+              <a:rPr lang="en-US" dirty="0" err="1" smtClean="0"/>
+              <a:t>surse</a:t>
+            </a:r>
+            <a:r>
+              <a:rPr lang="en-US" dirty="0" smtClean="0"/>
+              <a:t>, </a:t>
+            </a:r>
+            <a:r>
+              <a:rPr lang="en-US" dirty="0" err="1" smtClean="0"/>
+              <a:t>ceea</a:t>
+            </a:r>
+            <a:r>
+              <a:rPr lang="en-US" dirty="0" smtClean="0"/>
+              <a:t> </a:t>
+            </a:r>
+            <a:r>
+              <a:rPr lang="en-US" dirty="0" err="1" smtClean="0"/>
+              <a:t>ce</a:t>
+            </a:r>
+            <a:r>
+              <a:rPr lang="en-US" dirty="0" smtClean="0"/>
+              <a:t> in final </a:t>
+            </a:r>
+            <a:r>
+              <a:rPr lang="en-US" dirty="0" err="1" smtClean="0"/>
+              <a:t>inseamna</a:t>
+            </a:r>
+            <a:r>
+              <a:rPr lang="en-US" dirty="0" smtClean="0"/>
+              <a:t> ca </a:t>
+            </a:r>
+            <a:r>
+              <a:rPr lang="en-US" dirty="0" err="1" smtClean="0"/>
+              <a:t>cele</a:t>
+            </a:r>
+            <a:r>
+              <a:rPr lang="en-US" dirty="0" smtClean="0"/>
+              <a:t> 2 </a:t>
+            </a:r>
+            <a:r>
+              <a:rPr lang="en-US" dirty="0" err="1" smtClean="0"/>
+              <a:t>surse</a:t>
+            </a:r>
+            <a:r>
+              <a:rPr lang="en-US" dirty="0" smtClean="0"/>
+              <a:t> </a:t>
+            </a:r>
+            <a:r>
+              <a:rPr lang="en-US" dirty="0" err="1" smtClean="0"/>
+              <a:t>sunt</a:t>
+            </a:r>
+            <a:r>
+              <a:rPr lang="en-US" dirty="0" smtClean="0"/>
+              <a:t> </a:t>
+            </a:r>
+            <a:r>
+              <a:rPr lang="en-US" dirty="0" err="1" smtClean="0"/>
+              <a:t>defapt</a:t>
+            </a:r>
+            <a:r>
+              <a:rPr lang="en-US" dirty="0" smtClean="0"/>
+              <a:t> </a:t>
+            </a:r>
+            <a:r>
+              <a:rPr lang="en-US" dirty="0" err="1" smtClean="0"/>
+              <a:t>una</a:t>
+            </a:r>
+            <a:r>
+              <a:rPr lang="en-US" dirty="0" smtClean="0"/>
+              <a:t> </a:t>
+            </a:r>
+            <a:r>
+              <a:rPr lang="en-US" dirty="0" err="1" smtClean="0"/>
+              <a:t>si</a:t>
+            </a:r>
+            <a:r>
+              <a:rPr lang="en-US" dirty="0" smtClean="0"/>
+              <a:t> </a:t>
+            </a:r>
+            <a:r>
+              <a:rPr lang="en-US" dirty="0" err="1" smtClean="0"/>
+              <a:t>aceeasi</a:t>
+            </a:r>
+            <a:r>
+              <a:rPr lang="en-US" dirty="0" smtClean="0"/>
+              <a:t>.</a:t>
+            </a:r>
+          </a:p>
+          <a:p>
+            <a:r>
+              <a:rPr lang="en-US" dirty="0" smtClean="0"/>
+              <a:t>Ca </a:t>
+            </a:r>
+            <a:r>
+              <a:rPr lang="en-US" dirty="0" err="1" smtClean="0"/>
+              <a:t>sa</a:t>
+            </a:r>
+            <a:r>
+              <a:rPr lang="en-US" dirty="0" smtClean="0"/>
+              <a:t> </a:t>
+            </a:r>
+            <a:r>
+              <a:rPr lang="en-US" dirty="0" err="1" smtClean="0"/>
+              <a:t>vedem</a:t>
+            </a:r>
+            <a:r>
+              <a:rPr lang="en-US" dirty="0" smtClean="0"/>
+              <a:t> de </a:t>
+            </a:r>
+            <a:r>
+              <a:rPr lang="en-US" dirty="0" err="1" smtClean="0"/>
+              <a:t>ce</a:t>
+            </a:r>
+            <a:r>
+              <a:rPr lang="en-US" dirty="0" smtClean="0"/>
+              <a:t> </a:t>
+            </a:r>
+            <a:r>
+              <a:rPr lang="en-US" dirty="0" err="1" smtClean="0"/>
+              <a:t>surse</a:t>
+            </a:r>
+            <a:r>
+              <a:rPr lang="en-US" dirty="0" smtClean="0"/>
+              <a:t> cu </a:t>
+            </a:r>
+            <a:r>
+              <a:rPr lang="en-US" dirty="0" err="1" smtClean="0"/>
+              <a:t>distributii</a:t>
+            </a:r>
+            <a:r>
+              <a:rPr lang="en-US" dirty="0" smtClean="0"/>
+              <a:t> </a:t>
+            </a:r>
+            <a:r>
+              <a:rPr lang="en-US" dirty="0" err="1" smtClean="0"/>
+              <a:t>gaussiene</a:t>
+            </a:r>
+            <a:r>
+              <a:rPr lang="en-US" dirty="0" smtClean="0"/>
+              <a:t> </a:t>
+            </a:r>
+            <a:r>
+              <a:rPr lang="en-US" dirty="0" err="1" smtClean="0"/>
+              <a:t>sunt</a:t>
+            </a:r>
+            <a:r>
+              <a:rPr lang="en-US" dirty="0" smtClean="0"/>
+              <a:t> </a:t>
+            </a:r>
+            <a:r>
+              <a:rPr lang="en-US" dirty="0" err="1" smtClean="0"/>
+              <a:t>interzise</a:t>
+            </a:r>
+            <a:r>
+              <a:rPr lang="en-US" dirty="0" smtClean="0"/>
+              <a:t>, </a:t>
+            </a:r>
+            <a:r>
+              <a:rPr lang="en-US" dirty="0" err="1" smtClean="0"/>
+              <a:t>sa</a:t>
+            </a:r>
+            <a:r>
+              <a:rPr lang="en-US" dirty="0" smtClean="0"/>
+              <a:t> </a:t>
+            </a:r>
+            <a:r>
+              <a:rPr lang="en-US" dirty="0" err="1" smtClean="0"/>
+              <a:t>presupunem</a:t>
+            </a:r>
+            <a:r>
+              <a:rPr lang="en-US" dirty="0" smtClean="0"/>
+              <a:t> ca </a:t>
+            </a:r>
+            <a:r>
+              <a:rPr lang="en-US" dirty="0" err="1" smtClean="0"/>
+              <a:t>avem</a:t>
+            </a:r>
+            <a:r>
+              <a:rPr lang="en-US" dirty="0" smtClean="0"/>
+              <a:t> 2 </a:t>
+            </a:r>
+            <a:r>
+              <a:rPr lang="en-US" dirty="0" err="1" smtClean="0"/>
+              <a:t>surse</a:t>
+            </a:r>
+            <a:r>
+              <a:rPr lang="en-US" dirty="0" smtClean="0"/>
+              <a:t> de </a:t>
+            </a:r>
+            <a:r>
+              <a:rPr lang="en-US" dirty="0" err="1" smtClean="0"/>
+              <a:t>genul</a:t>
+            </a:r>
+            <a:r>
+              <a:rPr lang="en-US" dirty="0" smtClean="0"/>
+              <a:t>, </a:t>
+            </a:r>
+            <a:r>
+              <a:rPr lang="en-US" dirty="0" err="1" smtClean="0"/>
+              <a:t>iar</a:t>
+            </a:r>
+            <a:r>
+              <a:rPr lang="en-US" dirty="0" smtClean="0"/>
+              <a:t> </a:t>
+            </a:r>
+            <a:r>
+              <a:rPr lang="en-US" dirty="0" err="1" smtClean="0"/>
+              <a:t>operatorul</a:t>
+            </a:r>
+            <a:r>
+              <a:rPr lang="en-US" dirty="0" smtClean="0"/>
+              <a:t> </a:t>
+            </a:r>
+            <a:r>
+              <a:rPr lang="en-US" dirty="0" err="1" smtClean="0"/>
+              <a:t>lor</a:t>
+            </a:r>
+            <a:r>
+              <a:rPr lang="en-US" dirty="0" smtClean="0"/>
+              <a:t> de </a:t>
+            </a:r>
+            <a:r>
+              <a:rPr lang="en-US" dirty="0" err="1" smtClean="0"/>
+              <a:t>multiplicare</a:t>
+            </a:r>
+            <a:r>
+              <a:rPr lang="en-US" dirty="0" smtClean="0"/>
+              <a:t> </a:t>
+            </a:r>
+            <a:r>
+              <a:rPr lang="en-US" dirty="0" err="1" smtClean="0"/>
+              <a:t>este</a:t>
+            </a:r>
+            <a:r>
+              <a:rPr lang="en-US" dirty="0" smtClean="0"/>
+              <a:t> o </a:t>
+            </a:r>
+            <a:r>
+              <a:rPr lang="en-US" dirty="0" err="1" smtClean="0"/>
+              <a:t>matrice</a:t>
+            </a:r>
+            <a:r>
+              <a:rPr lang="en-US" dirty="0" smtClean="0"/>
+              <a:t> </a:t>
+            </a:r>
+            <a:r>
+              <a:rPr lang="en-US" dirty="0" err="1" smtClean="0"/>
+              <a:t>ortogonala</a:t>
+            </a:r>
+            <a:r>
+              <a:rPr lang="en-US" dirty="0" smtClean="0"/>
+              <a:t>. </a:t>
+            </a:r>
+            <a:r>
+              <a:rPr lang="en-US" dirty="0" err="1" smtClean="0"/>
+              <a:t>Densitatea</a:t>
+            </a:r>
+            <a:r>
+              <a:rPr lang="en-US" dirty="0" smtClean="0"/>
+              <a:t> </a:t>
+            </a:r>
+            <a:r>
+              <a:rPr lang="en-US" dirty="0" err="1" smtClean="0"/>
+              <a:t>semnalelor</a:t>
+            </a:r>
+            <a:r>
+              <a:rPr lang="en-US" dirty="0" smtClean="0"/>
+              <a:t> </a:t>
+            </a:r>
+            <a:r>
+              <a:rPr lang="en-US" dirty="0" err="1" smtClean="0"/>
+              <a:t>amestecate</a:t>
+            </a:r>
+            <a:r>
+              <a:rPr lang="en-US" dirty="0" smtClean="0"/>
+              <a:t> </a:t>
+            </a:r>
+            <a:r>
+              <a:rPr lang="en-US" dirty="0" err="1" smtClean="0"/>
+              <a:t>va</a:t>
+            </a:r>
+            <a:r>
+              <a:rPr lang="en-US" dirty="0" smtClean="0"/>
+              <a:t> fi la </a:t>
+            </a:r>
+            <a:r>
+              <a:rPr lang="en-US" dirty="0" err="1" smtClean="0"/>
+              <a:t>randul</a:t>
+            </a:r>
+            <a:r>
+              <a:rPr lang="en-US" dirty="0" smtClean="0"/>
+              <a:t> </a:t>
+            </a:r>
+            <a:r>
+              <a:rPr lang="en-US" dirty="0" err="1" smtClean="0"/>
+              <a:t>ei</a:t>
+            </a:r>
+            <a:r>
+              <a:rPr lang="en-US" dirty="0" smtClean="0"/>
+              <a:t> o </a:t>
+            </a:r>
+            <a:r>
+              <a:rPr lang="en-US" dirty="0" err="1" smtClean="0"/>
+              <a:t>functie</a:t>
+            </a:r>
+            <a:r>
+              <a:rPr lang="en-US" dirty="0" smtClean="0"/>
+              <a:t> cu </a:t>
+            </a:r>
+            <a:r>
+              <a:rPr lang="en-US" dirty="0" err="1" smtClean="0"/>
+              <a:t>distributie</a:t>
+            </a:r>
+            <a:r>
+              <a:rPr lang="en-US" dirty="0" smtClean="0"/>
+              <a:t> </a:t>
+            </a:r>
+            <a:r>
+              <a:rPr lang="en-US" dirty="0" err="1" smtClean="0"/>
+              <a:t>gaussiana</a:t>
+            </a:r>
+            <a:r>
+              <a:rPr lang="en-US" dirty="0" smtClean="0"/>
+              <a:t>, </a:t>
+            </a:r>
+            <a:r>
+              <a:rPr lang="en-US" dirty="0" err="1" smtClean="0"/>
+              <a:t>si</a:t>
+            </a:r>
+            <a:r>
+              <a:rPr lang="en-US" dirty="0" smtClean="0"/>
+              <a:t> </a:t>
+            </a:r>
+            <a:r>
+              <a:rPr lang="en-US" dirty="0" err="1" smtClean="0"/>
+              <a:t>arata</a:t>
+            </a:r>
+            <a:r>
+              <a:rPr lang="en-US" dirty="0" smtClean="0"/>
+              <a:t> </a:t>
+            </a:r>
+            <a:r>
+              <a:rPr lang="en-US" dirty="0" err="1" smtClean="0"/>
+              <a:t>astfel</a:t>
+            </a:r>
+            <a:r>
+              <a:rPr lang="en-US" dirty="0" smtClean="0"/>
+              <a:t>:</a:t>
+            </a:r>
+          </a:p>
+          <a:p>
+            <a:endParaRPr lang="en-US" dirty="0"/>
+          </a:p>
+        </p:txBody>
+      </p:sp>
+    </p:spTree>
+    <p:extLst>
+      <p:ext uri="{BB962C8B-B14F-4D97-AF65-F5344CB8AC3E}">
+        <p14:creationId xmlns:p14="http://schemas.microsoft.com/office/powerpoint/2010/main" val="401691252"/>
+      </p:ext>
+    </p:extLst>
+  </p:cSld>
+  <p:clrMapOvr>
+    <a:masterClrMapping/>
+  </p:clrMapOvr>
+</p:sld>
+</file>
+
+<file path=ppt/slides/slide7.xml><?xml version="1.0" encoding="utf-8"?>
+<p:sld xmlns:a="http://schemas.openxmlformats.org/drawingml/2006/main" xmlns:r="http://schemas.openxmlformats.org/officeDocument/2006/relationships" xmlns:p="http://schemas.openxmlformats.org/presentationml/2006/main">
+  <p:cSld>
+    <p:spTree>
+      <p:nvGrpSpPr>
+        <p:cNvPr id="1" name=""/>
+        <p:cNvGrpSpPr/>
+        <p:nvPr/>
+      </p:nvGrpSpPr>
+      <p:grpSpPr>
+        <a:xfrm>
+          <a:off x="0" y="0"/>
+          <a:ext cx="0" cy="0"/>
+          <a:chOff x="0" y="0"/>
+          <a:chExt cx="0" cy="0"/>
+        </a:xfrm>
+      </p:grpSpPr>
+      <p:pic>
+        <p:nvPicPr>
+          <p:cNvPr id="4" name="Content Placeholder 3"/>
+          <p:cNvPicPr>
+            <a:picLocks noGrp="1" noChangeAspect="1"/>
+          </p:cNvPicPr>
+          <p:nvPr>
+            <p:ph idx="1"/>
+          </p:nvPr>
+        </p:nvPicPr>
+        <p:blipFill>
+          <a:blip r:embed="rId2">
+            <a:extLst>
+              <a:ext uri="{28A0092B-C50C-407E-A947-70E740481C1C}">
+                <a14:useLocalDpi xmlns:a14="http://schemas.microsoft.com/office/drawing/2010/main" val="0"/>
+              </a:ext>
+            </a:extLst>
+          </a:blip>
+          <a:stretch>
+            <a:fillRect/>
+          </a:stretch>
+        </p:blipFill>
+        <p:spPr>
+          <a:xfrm>
+            <a:off x="3692322" y="151172"/>
+            <a:ext cx="4119267" cy="4141355"/>
+          </a:xfrm>
+        </p:spPr>
+      </p:pic>
       <mc:AlternateContent xmlns:mc="http://schemas.openxmlformats.org/markup-compatibility/2006">
         <mc:Choice xmlns:a14="http://schemas.microsoft.com/office/drawing/2010/main" Requires="a14">
           <p:sp>
             <p:nvSpPr>
-              <p:cNvPr id="3" name="Content Placeholder 2"/>
-              <p:cNvSpPr>
-                <a:spLocks noGrp="1"/>
-              </p:cNvSpPr>
-              <p:nvPr>
-                <p:ph idx="1"/>
-              </p:nvPr>
+              <p:cNvPr id="6" name="TextBox 5"/>
+              <p:cNvSpPr txBox="1"/>
+              <p:nvPr/>
             </p:nvSpPr>
-            <p:spPr/>
+            <p:spPr>
+              <a:xfrm>
+                <a:off x="261257" y="4894217"/>
+                <a:ext cx="11669486" cy="1477328"/>
+              </a:xfrm>
+              <a:prstGeom prst="rect">
+                <a:avLst/>
+              </a:prstGeom>
+              <a:noFill/>
+            </p:spPr>
             <p:txBody>
-              <a:bodyPr/>
+              <a:bodyPr wrap="square" rtlCol="0">
+                <a:spAutoFit/>
+              </a:bodyPr>
               <a:lstStyle/>
               <a:p>
-                <a:pPr marL="514350" indent="-514350">
-                  <a:buFont typeface="+mj-lt"/>
-                  <a:buAutoNum type="arabicPeriod"/>
-                </a:pPr>
-                <a:r>
-                  <a:rPr lang="en-US" dirty="0" smtClean="0"/>
-                  <a:t>Avem </a:t>
-                </a:r>
-                <a:r>
-                  <a:rPr lang="en-US" dirty="0" err="1" smtClean="0"/>
-                  <a:t>nevoie</a:t>
-                </a:r>
-                <a:r>
-                  <a:rPr lang="en-US" dirty="0" smtClean="0"/>
-                  <a:t> de </a:t>
-                </a:r>
-                <a:r>
-                  <a:rPr lang="en-US" dirty="0" err="1" smtClean="0"/>
-                  <a:t>atatea</a:t>
-                </a:r>
-                <a:r>
-                  <a:rPr lang="en-US" dirty="0" smtClean="0"/>
-                  <a:t> </a:t>
-                </a:r>
-                <a:r>
-                  <a:rPr lang="en-US" dirty="0" err="1" smtClean="0"/>
-                  <a:t>semnale</a:t>
-                </a:r>
-                <a:r>
-                  <a:rPr lang="en-US" dirty="0" smtClean="0"/>
-                  <a:t> </a:t>
-                </a:r>
-                <a:r>
-                  <a:rPr lang="en-US" dirty="0" err="1" smtClean="0"/>
-                  <a:t>inregristrate</a:t>
-                </a:r>
-                <a:r>
-                  <a:rPr lang="en-US" dirty="0" smtClean="0"/>
-                  <a:t> </a:t>
-                </a:r>
-                <a:r>
-                  <a:rPr lang="en-US" dirty="0" err="1" smtClean="0"/>
-                  <a:t>pe</a:t>
-                </a:r>
-                <a:r>
-                  <a:rPr lang="en-US" dirty="0" smtClean="0"/>
-                  <a:t> cate </a:t>
-                </a:r>
-                <a:r>
-                  <a:rPr lang="en-US" dirty="0" err="1" smtClean="0"/>
-                  <a:t>semnale</a:t>
-                </a:r>
-                <a:r>
-                  <a:rPr lang="en-US" dirty="0" smtClean="0"/>
-                  <a:t> </a:t>
-                </a:r>
-                <a:r>
-                  <a:rPr lang="en-US" dirty="0" err="1" smtClean="0"/>
-                  <a:t>vrem</a:t>
-                </a:r>
-                <a:r>
-                  <a:rPr lang="en-US" dirty="0" smtClean="0"/>
-                  <a:t> </a:t>
-                </a:r>
-                <a:r>
-                  <a:rPr lang="en-US" dirty="0" err="1" smtClean="0"/>
-                  <a:t>sa</a:t>
-                </a:r>
-                <a:r>
-                  <a:rPr lang="en-US" dirty="0" smtClean="0"/>
-                  <a:t> </a:t>
-                </a:r>
-                <a:r>
-                  <a:rPr lang="en-US" dirty="0" err="1" smtClean="0"/>
-                  <a:t>recuperam</a:t>
-                </a:r>
-                <a:r>
-                  <a:rPr lang="en-US" dirty="0" smtClean="0"/>
-                  <a:t>.</a:t>
-                </a:r>
-              </a:p>
-              <a:p>
-                <a:pPr marL="514350" indent="-514350">
-                  <a:buFont typeface="+mj-lt"/>
-                  <a:buAutoNum type="arabicPeriod"/>
-                </a:pPr>
-                <a:r>
-                  <a:rPr lang="en-US" dirty="0" smtClean="0"/>
-                  <a:t>Nu </a:t>
-                </a:r>
-                <a:r>
-                  <a:rPr lang="en-US" dirty="0" err="1" smtClean="0"/>
-                  <a:t>putem</a:t>
-                </a:r>
-                <a:r>
-                  <a:rPr lang="en-US" dirty="0" smtClean="0"/>
-                  <a:t> </a:t>
-                </a:r>
-                <a:r>
-                  <a:rPr lang="en-US" dirty="0" err="1" smtClean="0"/>
-                  <a:t>determina</a:t>
-                </a:r>
-                <a:r>
-                  <a:rPr lang="en-US" dirty="0" smtClean="0"/>
-                  <a:t> </a:t>
-                </a:r>
-                <a:r>
-                  <a:rPr lang="en-US" dirty="0" err="1" smtClean="0"/>
-                  <a:t>magnitudinile</a:t>
-                </a:r>
-                <a:r>
-                  <a:rPr lang="en-US" dirty="0" smtClean="0"/>
-                  <a:t> </a:t>
-                </a:r>
-                <a:r>
-                  <a:rPr lang="en-US" dirty="0" err="1" smtClean="0"/>
-                  <a:t>componentelor</a:t>
-                </a:r>
-                <a:r>
-                  <a:rPr lang="en-US" dirty="0" smtClean="0"/>
-                  <a:t> </a:t>
-                </a:r>
-                <a:r>
-                  <a:rPr lang="en-US" dirty="0" err="1" smtClean="0"/>
-                  <a:t>independente</a:t>
-                </a:r>
-                <a:r>
-                  <a:rPr lang="en-US" dirty="0" smtClean="0"/>
-                  <a:t>: </a:t>
-                </a:r>
-                <a:r>
-                  <a:rPr lang="en-US" dirty="0" err="1" smtClean="0"/>
-                  <a:t>acest</a:t>
-                </a:r>
-                <a:r>
-                  <a:rPr lang="en-US" dirty="0" smtClean="0"/>
-                  <a:t> </a:t>
-                </a:r>
-                <a:r>
-                  <a:rPr lang="en-US" dirty="0" err="1" smtClean="0"/>
-                  <a:t>lucru</a:t>
-                </a:r>
-                <a:r>
-                  <a:rPr lang="en-US" dirty="0" smtClean="0"/>
-                  <a:t> se </a:t>
-                </a:r>
-                <a:r>
-                  <a:rPr lang="en-US" dirty="0" err="1" smtClean="0"/>
-                  <a:t>datoreaza</a:t>
-                </a:r>
-                <a:r>
-                  <a:rPr lang="en-US" dirty="0" smtClean="0"/>
-                  <a:t> </a:t>
-                </a:r>
-                <a:r>
-                  <a:rPr lang="en-US" dirty="0" err="1" smtClean="0"/>
-                  <a:t>faptului</a:t>
-                </a:r>
-                <a:r>
-                  <a:rPr lang="en-US" dirty="0" smtClean="0"/>
-                  <a:t> ca, </a:t>
-                </a:r>
-                <a:r>
-                  <a:rPr lang="en-US" dirty="0" err="1" smtClean="0"/>
-                  <a:t>atat</a:t>
-                </a:r>
-                <a:r>
-                  <a:rPr lang="en-US" dirty="0" smtClean="0"/>
-                  <a:t> </a:t>
-                </a:r>
-                <a14:m>
-                  <m:oMath xmlns:m="http://schemas.openxmlformats.org/officeDocument/2006/math">
-                    <m:r>
-                      <a:rPr lang="en-US" b="0" i="1" smtClean="0">
-                        <a:latin typeface="Cambria Math" panose="02040503050406030204" pitchFamily="18" charset="0"/>
-                      </a:rPr>
-                      <m:t>𝑠</m:t>
-                    </m:r>
-                  </m:oMath>
-                </a14:m>
-                <a:r>
-                  <a:rPr lang="en-US" dirty="0" smtClean="0"/>
-                  <a:t> cat </a:t>
-                </a:r>
-                <a:r>
-                  <a:rPr lang="en-US" dirty="0" err="1" smtClean="0"/>
-                  <a:t>si</a:t>
+                <a:r>
+                  <a:rPr lang="en-US" dirty="0" smtClean="0"/>
+                  <a:t>Se </a:t>
+                </a:r>
+                <a:r>
+                  <a:rPr lang="en-US" dirty="0" err="1" smtClean="0"/>
+                  <a:t>observa</a:t>
+                </a:r>
+                <a:r>
+                  <a:rPr lang="en-US" dirty="0" smtClean="0"/>
+                  <a:t> ca </a:t>
+                </a:r>
+                <a:r>
+                  <a:rPr lang="en-US" dirty="0" err="1" smtClean="0"/>
+                  <a:t>aceasta</a:t>
+                </a:r>
+                <a:r>
+                  <a:rPr lang="en-US" dirty="0" smtClean="0"/>
+                  <a:t> </a:t>
+                </a:r>
+                <a:r>
+                  <a:rPr lang="en-US" dirty="0" err="1" smtClean="0"/>
+                  <a:t>distributie</a:t>
+                </a:r>
+                <a:r>
+                  <a:rPr lang="en-US" dirty="0" smtClean="0"/>
+                  <a:t> nu ne </a:t>
+                </a:r>
+                <a:r>
+                  <a:rPr lang="en-US" dirty="0" err="1" smtClean="0"/>
+                  <a:t>ofera</a:t>
+                </a:r>
+                <a:r>
+                  <a:rPr lang="en-US" dirty="0" smtClean="0"/>
+                  <a:t> </a:t>
+                </a:r>
+                <a:r>
+                  <a:rPr lang="en-US" dirty="0" err="1" smtClean="0"/>
+                  <a:t>nici</a:t>
+                </a:r>
+                <a:r>
+                  <a:rPr lang="en-US" dirty="0" smtClean="0"/>
+                  <a:t> o </a:t>
+                </a:r>
+                <a:r>
+                  <a:rPr lang="en-US" dirty="0" err="1" smtClean="0"/>
+                  <a:t>informatie</a:t>
+                </a:r>
+                <a:r>
+                  <a:rPr lang="en-US" dirty="0" smtClean="0"/>
+                  <a:t> </a:t>
+                </a:r>
+                <a:r>
+                  <a:rPr lang="en-US" dirty="0" err="1" smtClean="0"/>
+                  <a:t>asupra</a:t>
+                </a:r>
+                <a:r>
+                  <a:rPr lang="en-US" dirty="0" smtClean="0"/>
+                  <a:t> </a:t>
+                </a:r>
+                <a:r>
+                  <a:rPr lang="en-US" dirty="0" err="1" smtClean="0"/>
+                  <a:t>directiilor</a:t>
+                </a:r>
+                <a:r>
+                  <a:rPr lang="en-US" dirty="0" smtClean="0"/>
+                  <a:t> </a:t>
+                </a:r>
+                <a:r>
+                  <a:rPr lang="en-US" dirty="0" err="1" smtClean="0"/>
+                  <a:t>coloanelor</a:t>
+                </a:r>
+                <a:r>
+                  <a:rPr lang="en-US" dirty="0" smtClean="0"/>
+                  <a:t> </a:t>
+                </a:r>
+                <a:r>
+                  <a:rPr lang="en-US" dirty="0" err="1" smtClean="0"/>
+                  <a:t>lui</a:t>
                 </a:r>
                 <a:r>
                   <a:rPr lang="en-US" dirty="0" smtClean="0"/>
@@ -7497,43 +8181,198 @@
                 </a14:m>
                 <a:r>
                   <a:rPr lang="en-US" dirty="0" smtClean="0"/>
-                  <a:t> </a:t>
-                </a:r>
-                <a:r>
-                  <a:rPr lang="en-US" dirty="0" err="1" smtClean="0"/>
-                  <a:t>sunt</a:t>
-                </a:r>
-                <a:r>
-                  <a:rPr lang="en-US" dirty="0" smtClean="0"/>
-                  <a:t> </a:t>
-                </a:r>
-                <a:r>
-                  <a:rPr lang="en-US" dirty="0" err="1" smtClean="0"/>
-                  <a:t>necunoscute</a:t>
-                </a:r>
-                <a:r>
-                  <a:rPr lang="en-US" dirty="0" smtClean="0"/>
                   <a:t>, </a:t>
                 </a:r>
                 <a:r>
                   <a:rPr lang="en-US" dirty="0" err="1" smtClean="0"/>
-                  <a:t>orice</a:t>
-                </a:r>
-                <a:r>
-                  <a:rPr lang="en-US" dirty="0" smtClean="0"/>
-                  <a:t> </a:t>
-                </a:r>
-                <a:r>
-                  <a:rPr lang="en-US" dirty="0" err="1" smtClean="0"/>
-                  <a:t>multiplicator</a:t>
-                </a:r>
-                <a:r>
-                  <a:rPr lang="en-US" dirty="0" smtClean="0"/>
-                  <a:t> al </a:t>
-                </a:r>
-                <a:r>
-                  <a:rPr lang="en-US" dirty="0" err="1" smtClean="0"/>
-                  <a:t>surselor</a:t>
+                  <a:t>deoarece</a:t>
+                </a:r>
+                <a:r>
+                  <a:rPr lang="en-US" dirty="0" smtClean="0"/>
+                  <a:t> </a:t>
+                </a:r>
+                <a:r>
+                  <a:rPr lang="en-US" dirty="0" err="1" smtClean="0"/>
+                  <a:t>densitatea</a:t>
+                </a:r>
+                <a:r>
+                  <a:rPr lang="en-US" dirty="0" smtClean="0"/>
+                  <a:t> </a:t>
+                </a:r>
+                <a:r>
+                  <a:rPr lang="en-US" dirty="0" err="1" smtClean="0"/>
+                  <a:t>este</a:t>
+                </a:r>
+                <a:r>
+                  <a:rPr lang="en-US" dirty="0" smtClean="0"/>
+                  <a:t> </a:t>
+                </a:r>
+                <a:r>
+                  <a:rPr lang="en-US" dirty="0" err="1" smtClean="0"/>
+                  <a:t>complet</a:t>
+                </a:r>
+                <a:r>
+                  <a:rPr lang="en-US" dirty="0" smtClean="0"/>
+                  <a:t> </a:t>
+                </a:r>
+                <a:r>
+                  <a:rPr lang="en-US" dirty="0" err="1" smtClean="0"/>
+                  <a:t>simetrica</a:t>
+                </a:r>
+                <a:r>
+                  <a:rPr lang="en-US" dirty="0" smtClean="0"/>
+                  <a:t>, </a:t>
+                </a:r>
+                <a:r>
+                  <a:rPr lang="en-US" dirty="0" err="1" smtClean="0"/>
+                  <a:t>iar</a:t>
+                </a:r>
+                <a:r>
+                  <a:rPr lang="en-US" dirty="0" smtClean="0"/>
+                  <a:t> </a:t>
+                </a:r>
+                <a14:m>
+                  <m:oMath xmlns:m="http://schemas.openxmlformats.org/officeDocument/2006/math">
+                    <m:r>
+                      <a:rPr lang="en-US" b="0" i="1" smtClean="0">
+                        <a:latin typeface="Cambria Math" panose="02040503050406030204" pitchFamily="18" charset="0"/>
+                      </a:rPr>
+                      <m:t>𝐴</m:t>
+                    </m:r>
+                  </m:oMath>
+                </a14:m>
+                <a:r>
+                  <a:rPr lang="en-US" dirty="0" smtClean="0"/>
+                  <a:t>, </a:t>
+                </a:r>
+                <a:r>
+                  <a:rPr lang="en-US" dirty="0" err="1" smtClean="0"/>
+                  <a:t>si</a:t>
+                </a:r>
+                <a:r>
+                  <a:rPr lang="en-US" dirty="0" smtClean="0"/>
+                  <a:t> </a:t>
+                </a:r>
+                <a:r>
+                  <a:rPr lang="en-US" dirty="0" err="1" smtClean="0"/>
+                  <a:t>respectiv</a:t>
+                </a:r>
+                <a:r>
+                  <a:rPr lang="en-US" dirty="0" smtClean="0"/>
+                  <a:t> </a:t>
+                </a:r>
+                <a14:m>
+                  <m:oMath xmlns:m="http://schemas.openxmlformats.org/officeDocument/2006/math">
+                    <m:sSup>
+                      <m:sSupPr>
+                        <m:ctrlPr>
+                          <a:rPr lang="en-US" b="0" i="1" smtClean="0">
+                            <a:latin typeface="Cambria Math" panose="02040503050406030204" pitchFamily="18" charset="0"/>
+                          </a:rPr>
+                        </m:ctrlPr>
+                      </m:sSupPr>
+                      <m:e>
+                        <m:r>
+                          <a:rPr lang="en-US" b="0" i="1" smtClean="0">
+                            <a:latin typeface="Cambria Math" panose="02040503050406030204" pitchFamily="18" charset="0"/>
+                          </a:rPr>
+                          <m:t>𝐴</m:t>
+                        </m:r>
+                      </m:e>
+                      <m:sup>
+                        <m:r>
+                          <a:rPr lang="en-US" b="0" i="1" smtClean="0">
+                            <a:latin typeface="Cambria Math" panose="02040503050406030204" pitchFamily="18" charset="0"/>
+                          </a:rPr>
+                          <m:t>−1</m:t>
+                        </m:r>
+                      </m:sup>
+                    </m:sSup>
+                  </m:oMath>
+                </a14:m>
+                <a:r>
+                  <a:rPr lang="en-US" dirty="0" smtClean="0"/>
+                  <a:t> nu </a:t>
+                </a:r>
+                <a:r>
+                  <a:rPr lang="en-US" dirty="0" err="1" smtClean="0"/>
+                  <a:t>poate</a:t>
+                </a:r>
+                <a:r>
+                  <a:rPr lang="en-US" dirty="0" smtClean="0"/>
+                  <a:t> fi </a:t>
+                </a:r>
+                <a:r>
+                  <a:rPr lang="en-US" dirty="0" err="1" smtClean="0"/>
+                  <a:t>determinat</a:t>
+                </a:r>
+                <a:r>
+                  <a:rPr lang="en-US" dirty="0" smtClean="0"/>
+                  <a:t>. </a:t>
+                </a:r>
+              </a:p>
+              <a:p>
+                <a:r>
+                  <a:rPr lang="en-US" dirty="0" smtClean="0"/>
+                  <a:t>Si </a:t>
+                </a:r>
+                <a:r>
+                  <a:rPr lang="en-US" dirty="0" err="1" smtClean="0"/>
+                  <a:t>daca</a:t>
+                </a:r>
+                <a:r>
+                  <a:rPr lang="en-US" dirty="0" smtClean="0"/>
+                  <a:t> nu am </a:t>
+                </a:r>
+                <a:r>
+                  <a:rPr lang="en-US" dirty="0" err="1" smtClean="0"/>
+                  <a:t>avea</a:t>
+                </a:r>
+                <a:r>
+                  <a:rPr lang="en-US" dirty="0" smtClean="0"/>
+                  <a:t> o </a:t>
+                </a:r>
+                <a:r>
+                  <a:rPr lang="en-US" dirty="0" err="1" smtClean="0"/>
+                  <a:t>matrice</a:t>
+                </a:r>
+                <a:r>
+                  <a:rPr lang="en-US" dirty="0" smtClean="0"/>
+                  <a:t> de </a:t>
+                </a:r>
+                <a:r>
+                  <a:rPr lang="en-US" dirty="0" err="1" smtClean="0"/>
+                  <a:t>multiplicare</a:t>
+                </a:r>
+                <a:r>
+                  <a:rPr lang="en-US" dirty="0" smtClean="0"/>
+                  <a:t> </a:t>
+                </a:r>
+                <a14:m>
+                  <m:oMath xmlns:m="http://schemas.openxmlformats.org/officeDocument/2006/math">
+                    <m:r>
+                      <a:rPr lang="en-US" b="0" i="1" smtClean="0">
+                        <a:latin typeface="Cambria Math" panose="02040503050406030204" pitchFamily="18" charset="0"/>
+                      </a:rPr>
+                      <m:t>𝐴</m:t>
+                    </m:r>
+                  </m:oMath>
+                </a14:m>
+                <a:r>
+                  <a:rPr lang="en-US" dirty="0" smtClean="0"/>
+                  <a:t> </a:t>
+                </a:r>
+                <a:r>
+                  <a:rPr lang="en-US" dirty="0" err="1" smtClean="0"/>
+                  <a:t>ortonormala</a:t>
+                </a:r>
+                <a:r>
+                  <a:rPr lang="en-US" dirty="0" smtClean="0"/>
+                  <a:t>, </a:t>
+                </a:r>
+                <a:r>
+                  <a:rPr lang="en-US" dirty="0" err="1" smtClean="0"/>
+                  <a:t>dar</a:t>
                 </a:r>
                 <a:r>
                   <a:rPr lang="en-US" dirty="0" smtClean="0"/>
@@ -7570,6 +8409,608 @@
                 </a14:m>
                 <a:r>
                   <a:rPr lang="en-US" dirty="0" smtClean="0"/>
+                  <a:t> au </a:t>
+                </a:r>
+                <a:r>
+                  <a:rPr lang="en-US" dirty="0" err="1" smtClean="0"/>
+                  <a:t>distributii</a:t>
+                </a:r>
+                <a:r>
+                  <a:rPr lang="en-US" dirty="0" smtClean="0"/>
+                  <a:t> </a:t>
+                </a:r>
+                <a:r>
+                  <a:rPr lang="en-US" dirty="0" err="1" smtClean="0"/>
+                  <a:t>gaussiene</a:t>
+                </a:r>
+                <a:r>
+                  <a:rPr lang="en-US" dirty="0" smtClean="0"/>
+                  <a:t>, </a:t>
+                </a:r>
+                <a:r>
+                  <a:rPr lang="en-US" dirty="0" err="1" smtClean="0"/>
+                  <a:t>vom</a:t>
+                </a:r>
+                <a:r>
+                  <a:rPr lang="en-US" dirty="0" smtClean="0"/>
+                  <a:t> </a:t>
+                </a:r>
+                <a:r>
+                  <a:rPr lang="en-US" dirty="0" err="1" smtClean="0"/>
+                  <a:t>putea</a:t>
+                </a:r>
+                <a:r>
+                  <a:rPr lang="en-US" dirty="0" smtClean="0"/>
+                  <a:t> </a:t>
+                </a:r>
+                <a:r>
+                  <a:rPr lang="en-US" dirty="0" err="1" smtClean="0"/>
+                  <a:t>estima</a:t>
+                </a:r>
+                <a:r>
+                  <a:rPr lang="en-US" dirty="0" smtClean="0"/>
+                  <a:t> </a:t>
+                </a:r>
+                <a:r>
+                  <a:rPr lang="en-US" dirty="0" err="1" smtClean="0"/>
+                  <a:t>matricea</a:t>
+                </a:r>
+                <a:r>
+                  <a:rPr lang="en-US" dirty="0" smtClean="0"/>
+                  <a:t> </a:t>
+                </a:r>
+                <a14:m>
+                  <m:oMath xmlns:m="http://schemas.openxmlformats.org/officeDocument/2006/math">
+                    <m:r>
+                      <a:rPr lang="en-US" b="0" i="1" smtClean="0">
+                        <a:latin typeface="Cambria Math" panose="02040503050406030204" pitchFamily="18" charset="0"/>
+                      </a:rPr>
+                      <m:t>𝐴</m:t>
+                    </m:r>
+                  </m:oMath>
+                </a14:m>
+                <a:r>
+                  <a:rPr lang="en-US" dirty="0" smtClean="0"/>
+                  <a:t> </a:t>
+                </a:r>
+                <a:r>
+                  <a:rPr lang="en-US" dirty="0" err="1" smtClean="0"/>
+                  <a:t>doar</a:t>
+                </a:r>
+                <a:r>
+                  <a:rPr lang="en-US" dirty="0" smtClean="0"/>
+                  <a:t> </a:t>
+                </a:r>
+                <a:r>
+                  <a:rPr lang="en-US" dirty="0" err="1" smtClean="0"/>
+                  <a:t>pana</a:t>
+                </a:r>
+                <a:r>
+                  <a:rPr lang="en-US" dirty="0" smtClean="0"/>
+                  <a:t> la o </a:t>
+                </a:r>
+                <a:r>
+                  <a:rPr lang="en-US" dirty="0" err="1" smtClean="0"/>
+                  <a:t>transformare</a:t>
+                </a:r>
+                <a:r>
+                  <a:rPr lang="en-US" dirty="0" smtClean="0"/>
+                  <a:t> </a:t>
+                </a:r>
+                <a:r>
+                  <a:rPr lang="en-US" dirty="0" err="1" smtClean="0"/>
+                  <a:t>ortonormala</a:t>
+                </a:r>
+                <a:r>
+                  <a:rPr lang="en-US" dirty="0" smtClean="0"/>
+                  <a:t>, </a:t>
+                </a:r>
+                <a:r>
+                  <a:rPr lang="en-US" dirty="0" err="1" smtClean="0"/>
+                  <a:t>iar</a:t>
+                </a:r>
+                <a:r>
+                  <a:rPr lang="en-US" dirty="0" smtClean="0"/>
+                  <a:t> </a:t>
+                </a:r>
+                <a:r>
+                  <a:rPr lang="en-US" dirty="0" err="1" smtClean="0"/>
+                  <a:t>apoi</a:t>
+                </a:r>
+                <a:r>
+                  <a:rPr lang="en-US" dirty="0" smtClean="0"/>
+                  <a:t>, ca </a:t>
+                </a:r>
+                <a:r>
+                  <a:rPr lang="en-US" dirty="0" err="1" smtClean="0"/>
+                  <a:t>mai</a:t>
+                </a:r>
+                <a:r>
+                  <a:rPr lang="en-US" dirty="0" smtClean="0"/>
+                  <a:t> </a:t>
+                </a:r>
+                <a:r>
+                  <a:rPr lang="en-US" dirty="0" err="1" smtClean="0"/>
+                  <a:t>inainte</a:t>
+                </a:r>
+                <a:r>
+                  <a:rPr lang="en-US" dirty="0" smtClean="0"/>
+                  <a:t>, </a:t>
+                </a:r>
+                <a:r>
+                  <a:rPr lang="en-US" dirty="0" err="1" smtClean="0"/>
+                  <a:t>distributia</a:t>
+                </a:r>
+                <a:r>
+                  <a:rPr lang="en-US" dirty="0" smtClean="0"/>
+                  <a:t> </a:t>
+                </a:r>
+                <a:r>
+                  <a:rPr lang="en-US" dirty="0" err="1" smtClean="0"/>
+                  <a:t>fiind</a:t>
+                </a:r>
+                <a:r>
+                  <a:rPr lang="en-US" dirty="0" smtClean="0"/>
+                  <a:t> </a:t>
+                </a:r>
+                <a:r>
+                  <a:rPr lang="en-US" dirty="0" err="1" smtClean="0"/>
+                  <a:t>gaussiana</a:t>
+                </a:r>
+                <a:r>
+                  <a:rPr lang="en-US" dirty="0" smtClean="0"/>
+                  <a:t>, nu </a:t>
+                </a:r>
+                <a:r>
+                  <a:rPr lang="en-US" dirty="0" err="1" smtClean="0"/>
+                  <a:t>putem</a:t>
+                </a:r>
+                <a:r>
+                  <a:rPr lang="en-US" dirty="0" smtClean="0"/>
+                  <a:t> </a:t>
+                </a:r>
+                <a:r>
+                  <a:rPr lang="en-US" dirty="0" err="1" smtClean="0"/>
+                  <a:t>aproxima</a:t>
+                </a:r>
+                <a:r>
+                  <a:rPr lang="en-US" dirty="0" smtClean="0"/>
+                  <a:t> </a:t>
+                </a:r>
+                <a:r>
+                  <a:rPr lang="en-US" dirty="0" err="1" smtClean="0"/>
+                  <a:t>directiile</a:t>
+                </a:r>
+                <a:r>
+                  <a:rPr lang="en-US" dirty="0" smtClean="0"/>
+                  <a:t> </a:t>
+                </a:r>
+                <a:r>
+                  <a:rPr lang="en-US" dirty="0" err="1" smtClean="0"/>
+                  <a:t>coloanelor</a:t>
+                </a:r>
+                <a:r>
+                  <a:rPr lang="en-US" dirty="0" smtClean="0"/>
+                  <a:t> </a:t>
+                </a:r>
+                <a:r>
+                  <a:rPr lang="en-US" dirty="0" err="1" smtClean="0"/>
+                  <a:t>lui</a:t>
+                </a:r>
+                <a:r>
+                  <a:rPr lang="en-US" dirty="0" smtClean="0"/>
+                  <a:t> </a:t>
+                </a:r>
+                <a14:m>
+                  <m:oMath xmlns:m="http://schemas.openxmlformats.org/officeDocument/2006/math">
+                    <m:r>
+                      <a:rPr lang="en-US" b="0" i="1" smtClean="0">
+                        <a:latin typeface="Cambria Math" panose="02040503050406030204" pitchFamily="18" charset="0"/>
+                      </a:rPr>
+                      <m:t>𝐴</m:t>
+                    </m:r>
+                  </m:oMath>
+                </a14:m>
+                <a:r>
+                  <a:rPr lang="en-US" dirty="0" smtClean="0"/>
+                  <a:t>.</a:t>
+                </a:r>
+                <a:endParaRPr lang="en-US" dirty="0"/>
+              </a:p>
+            </p:txBody>
+          </p:sp>
+        </mc:Choice>
+        <mc:Fallback>
+          <p:sp>
+            <p:nvSpPr>
+              <p:cNvPr id="6" name="TextBox 5"/>
+              <p:cNvSpPr txBox="1">
+                <a:spLocks noRot="1" noChangeAspect="1" noMove="1" noResize="1" noEditPoints="1" noAdjustHandles="1" noChangeArrowheads="1" noChangeShapeType="1" noTextEdit="1"/>
+              </p:cNvSpPr>
+              <p:nvPr/>
+            </p:nvSpPr>
+            <p:spPr>
+              <a:xfrm>
+                <a:off x="261257" y="4894217"/>
+                <a:ext cx="11669486" cy="1477328"/>
+              </a:xfrm>
+              <a:prstGeom prst="rect">
+                <a:avLst/>
+              </a:prstGeom>
+              <a:blipFill rotWithShape="0">
+                <a:blip r:embed="rId3"/>
+                <a:stretch>
+                  <a:fillRect l="-470" t="-2479" b="-5785"/>
+                </a:stretch>
+              </a:blipFill>
+            </p:spPr>
+            <p:txBody>
+              <a:bodyPr/>
+              <a:lstStyle/>
+              <a:p>
+                <a:r>
+                  <a:rPr lang="en-US">
+                    <a:noFill/>
+                  </a:rPr>
+                  <a:t> </a:t>
+                </a:r>
+              </a:p>
+            </p:txBody>
+          </p:sp>
+        </mc:Fallback>
+      </mc:AlternateContent>
+    </p:spTree>
+    <p:extLst>
+      <p:ext uri="{BB962C8B-B14F-4D97-AF65-F5344CB8AC3E}">
+        <p14:creationId xmlns:p14="http://schemas.microsoft.com/office/powerpoint/2010/main" val="2283343980"/>
+      </p:ext>
+    </p:extLst>
+  </p:cSld>
+  <p:clrMapOvr>
+    <a:masterClrMapping/>
+  </p:clrMapOvr>
+</p:sld>
+</file>
+
+<file path=ppt/slides/slide8.xml><?xml version="1.0" encoding="utf-8"?>
+<p:sld xmlns:a="http://schemas.openxmlformats.org/drawingml/2006/main" xmlns:r="http://schemas.openxmlformats.org/officeDocument/2006/relationships" xmlns:p="http://schemas.openxmlformats.org/presentationml/2006/main">
+  <p:cSld>
+    <p:spTree>
+      <p:nvGrpSpPr>
+        <p:cNvPr id="1" name=""/>
+        <p:cNvGrpSpPr/>
+        <p:nvPr/>
+      </p:nvGrpSpPr>
+      <p:grpSpPr>
+        <a:xfrm>
+          <a:off x="0" y="0"/>
+          <a:ext cx="0" cy="0"/>
+          <a:chOff x="0" y="0"/>
+          <a:chExt cx="0" cy="0"/>
+        </a:xfrm>
+      </p:grpSpPr>
+      <p:sp>
+        <p:nvSpPr>
+          <p:cNvPr id="2" name="Title 1"/>
+          <p:cNvSpPr>
+            <a:spLocks noGrp="1"/>
+          </p:cNvSpPr>
+          <p:nvPr>
+            <p:ph type="title"/>
+          </p:nvPr>
+        </p:nvSpPr>
+        <p:spPr/>
+        <p:txBody>
+          <a:bodyPr/>
+          <a:lstStyle/>
+          <a:p>
+            <a:pPr algn="ctr"/>
+            <a:r>
+              <a:rPr lang="en-US" b="1" dirty="0" err="1" smtClean="0"/>
+              <a:t>Limitari</a:t>
+            </a:r>
+            <a:r>
+              <a:rPr lang="en-US" b="1" dirty="0" smtClean="0"/>
+              <a:t> ale ICA</a:t>
+            </a:r>
+            <a:endParaRPr lang="en-US" b="1" dirty="0"/>
+          </a:p>
+        </p:txBody>
+      </p:sp>
+      <mc:AlternateContent xmlns:mc="http://schemas.openxmlformats.org/markup-compatibility/2006">
+        <mc:Choice xmlns:a14="http://schemas.microsoft.com/office/drawing/2010/main" Requires="a14">
+          <p:sp>
+            <p:nvSpPr>
+              <p:cNvPr id="3" name="Content Placeholder 2"/>
+              <p:cNvSpPr>
+                <a:spLocks noGrp="1"/>
+              </p:cNvSpPr>
+              <p:nvPr>
+                <p:ph idx="1"/>
+              </p:nvPr>
+            </p:nvSpPr>
+            <p:spPr/>
+            <p:txBody>
+              <a:bodyPr/>
+              <a:lstStyle/>
+              <a:p>
+                <a:pPr marL="514350" indent="-514350">
+                  <a:buFont typeface="+mj-lt"/>
+                  <a:buAutoNum type="arabicPeriod"/>
+                </a:pPr>
+                <a:r>
+                  <a:rPr lang="en-US" dirty="0" smtClean="0"/>
+                  <a:t>Avem </a:t>
+                </a:r>
+                <a:r>
+                  <a:rPr lang="en-US" dirty="0" err="1" smtClean="0"/>
+                  <a:t>nevoie</a:t>
+                </a:r>
+                <a:r>
+                  <a:rPr lang="en-US" dirty="0" smtClean="0"/>
+                  <a:t> de </a:t>
+                </a:r>
+                <a:r>
+                  <a:rPr lang="en-US" dirty="0" err="1" smtClean="0"/>
+                  <a:t>atatea</a:t>
+                </a:r>
+                <a:r>
+                  <a:rPr lang="en-US" dirty="0" smtClean="0"/>
+                  <a:t> </a:t>
+                </a:r>
+                <a:r>
+                  <a:rPr lang="en-US" dirty="0" err="1" smtClean="0"/>
+                  <a:t>semnale</a:t>
+                </a:r>
+                <a:r>
+                  <a:rPr lang="en-US" dirty="0" smtClean="0"/>
+                  <a:t> </a:t>
+                </a:r>
+                <a:r>
+                  <a:rPr lang="en-US" dirty="0" err="1" smtClean="0"/>
+                  <a:t>inregristrate</a:t>
+                </a:r>
+                <a:r>
+                  <a:rPr lang="en-US" dirty="0" smtClean="0"/>
+                  <a:t> </a:t>
+                </a:r>
+                <a:r>
+                  <a:rPr lang="en-US" dirty="0" err="1" smtClean="0"/>
+                  <a:t>pe</a:t>
+                </a:r>
+                <a:r>
+                  <a:rPr lang="en-US" dirty="0" smtClean="0"/>
+                  <a:t> cate </a:t>
+                </a:r>
+                <a:r>
+                  <a:rPr lang="en-US" dirty="0" err="1" smtClean="0"/>
+                  <a:t>semnale</a:t>
+                </a:r>
+                <a:r>
+                  <a:rPr lang="en-US" dirty="0" smtClean="0"/>
+                  <a:t> </a:t>
+                </a:r>
+                <a:r>
+                  <a:rPr lang="en-US" dirty="0" err="1" smtClean="0"/>
+                  <a:t>vrem</a:t>
+                </a:r>
+                <a:r>
+                  <a:rPr lang="en-US" dirty="0" smtClean="0"/>
+                  <a:t> </a:t>
+                </a:r>
+                <a:r>
+                  <a:rPr lang="en-US" dirty="0" err="1" smtClean="0"/>
+                  <a:t>sa</a:t>
+                </a:r>
+                <a:r>
+                  <a:rPr lang="en-US" dirty="0" smtClean="0"/>
+                  <a:t> </a:t>
+                </a:r>
+                <a:r>
+                  <a:rPr lang="en-US" dirty="0" err="1" smtClean="0"/>
+                  <a:t>recuperam</a:t>
+                </a:r>
+                <a:r>
+                  <a:rPr lang="en-US" dirty="0" smtClean="0"/>
+                  <a:t>.</a:t>
+                </a:r>
+              </a:p>
+              <a:p>
+                <a:pPr marL="514350" indent="-514350">
+                  <a:buFont typeface="+mj-lt"/>
+                  <a:buAutoNum type="arabicPeriod"/>
+                </a:pPr>
+                <a:r>
+                  <a:rPr lang="en-US" dirty="0" smtClean="0"/>
+                  <a:t>Nu </a:t>
+                </a:r>
+                <a:r>
+                  <a:rPr lang="en-US" dirty="0" err="1" smtClean="0"/>
+                  <a:t>putem</a:t>
+                </a:r>
+                <a:r>
+                  <a:rPr lang="en-US" dirty="0" smtClean="0"/>
+                  <a:t> </a:t>
+                </a:r>
+                <a:r>
+                  <a:rPr lang="en-US" dirty="0" err="1" smtClean="0"/>
+                  <a:t>determina</a:t>
+                </a:r>
+                <a:r>
+                  <a:rPr lang="en-US" dirty="0" smtClean="0"/>
+                  <a:t> </a:t>
+                </a:r>
+                <a:r>
+                  <a:rPr lang="en-US" dirty="0" err="1" smtClean="0"/>
+                  <a:t>magnitudinile</a:t>
+                </a:r>
+                <a:r>
+                  <a:rPr lang="en-US" dirty="0" smtClean="0"/>
+                  <a:t> </a:t>
+                </a:r>
+                <a:r>
+                  <a:rPr lang="en-US" dirty="0" err="1" smtClean="0"/>
+                  <a:t>componentelor</a:t>
+                </a:r>
+                <a:r>
+                  <a:rPr lang="en-US" dirty="0" smtClean="0"/>
+                  <a:t> </a:t>
+                </a:r>
+                <a:r>
+                  <a:rPr lang="en-US" dirty="0" err="1" smtClean="0"/>
+                  <a:t>independente</a:t>
+                </a:r>
+                <a:r>
+                  <a:rPr lang="en-US" dirty="0" smtClean="0"/>
+                  <a:t>: </a:t>
+                </a:r>
+                <a:r>
+                  <a:rPr lang="en-US" dirty="0" err="1" smtClean="0"/>
+                  <a:t>acest</a:t>
+                </a:r>
+                <a:r>
+                  <a:rPr lang="en-US" dirty="0" smtClean="0"/>
+                  <a:t> </a:t>
+                </a:r>
+                <a:r>
+                  <a:rPr lang="en-US" dirty="0" err="1" smtClean="0"/>
+                  <a:t>lucru</a:t>
+                </a:r>
+                <a:r>
+                  <a:rPr lang="en-US" dirty="0" smtClean="0"/>
+                  <a:t> se </a:t>
+                </a:r>
+                <a:r>
+                  <a:rPr lang="en-US" dirty="0" err="1" smtClean="0"/>
+                  <a:t>datoreaza</a:t>
+                </a:r>
+                <a:r>
+                  <a:rPr lang="en-US" dirty="0" smtClean="0"/>
+                  <a:t> </a:t>
+                </a:r>
+                <a:r>
+                  <a:rPr lang="en-US" dirty="0" err="1" smtClean="0"/>
+                  <a:t>faptului</a:t>
+                </a:r>
+                <a:r>
+                  <a:rPr lang="en-US" dirty="0" smtClean="0"/>
+                  <a:t> ca, </a:t>
+                </a:r>
+                <a:r>
+                  <a:rPr lang="en-US" dirty="0" err="1" smtClean="0"/>
+                  <a:t>atat</a:t>
+                </a:r>
+                <a:r>
+                  <a:rPr lang="en-US" dirty="0" smtClean="0"/>
+                  <a:t> </a:t>
+                </a:r>
+                <a14:m>
+                  <m:oMath xmlns:m="http://schemas.openxmlformats.org/officeDocument/2006/math">
+                    <m:r>
+                      <a:rPr lang="en-US" b="0" i="1" smtClean="0">
+                        <a:latin typeface="Cambria Math" panose="02040503050406030204" pitchFamily="18" charset="0"/>
+                      </a:rPr>
+                      <m:t>𝑠</m:t>
+                    </m:r>
+                  </m:oMath>
+                </a14:m>
+                <a:r>
+                  <a:rPr lang="en-US" dirty="0" smtClean="0"/>
+                  <a:t> cat </a:t>
+                </a:r>
+                <a:r>
+                  <a:rPr lang="en-US" dirty="0" err="1" smtClean="0"/>
+                  <a:t>si</a:t>
+                </a:r>
+                <a:r>
+                  <a:rPr lang="en-US" dirty="0" smtClean="0"/>
+                  <a:t> </a:t>
+                </a:r>
+                <a14:m>
+                  <m:oMath xmlns:m="http://schemas.openxmlformats.org/officeDocument/2006/math">
+                    <m:r>
+                      <a:rPr lang="en-US" b="0" i="1" smtClean="0">
+                        <a:latin typeface="Cambria Math" panose="02040503050406030204" pitchFamily="18" charset="0"/>
+                      </a:rPr>
+                      <m:t>𝐴</m:t>
+                    </m:r>
+                  </m:oMath>
+                </a14:m>
+                <a:r>
+                  <a:rPr lang="en-US" dirty="0" smtClean="0"/>
+                  <a:t> </a:t>
+                </a:r>
+                <a:r>
+                  <a:rPr lang="en-US" dirty="0" err="1" smtClean="0"/>
+                  <a:t>sunt</a:t>
+                </a:r>
+                <a:r>
+                  <a:rPr lang="en-US" dirty="0" smtClean="0"/>
+                  <a:t> </a:t>
+                </a:r>
+                <a:r>
+                  <a:rPr lang="en-US" dirty="0" err="1" smtClean="0"/>
+                  <a:t>necunoscute</a:t>
+                </a:r>
+                <a:r>
+                  <a:rPr lang="en-US" dirty="0" smtClean="0"/>
+                  <a:t>, </a:t>
+                </a:r>
+                <a:r>
+                  <a:rPr lang="en-US" dirty="0" err="1" smtClean="0"/>
+                  <a:t>orice</a:t>
+                </a:r>
+                <a:r>
+                  <a:rPr lang="en-US" dirty="0" smtClean="0"/>
+                  <a:t> </a:t>
+                </a:r>
+                <a:r>
+                  <a:rPr lang="en-US" dirty="0" err="1" smtClean="0"/>
+                  <a:t>multiplicator</a:t>
+                </a:r>
+                <a:r>
+                  <a:rPr lang="en-US" dirty="0" smtClean="0"/>
+                  <a:t> al </a:t>
+                </a:r>
+                <a:r>
+                  <a:rPr lang="en-US" dirty="0" err="1" smtClean="0"/>
+                  <a:t>surselor</a:t>
+                </a:r>
+                <a:r>
+                  <a:rPr lang="en-US" dirty="0" smtClean="0"/>
+                  <a:t> </a:t>
+                </a:r>
+                <a14:m>
+                  <m:oMath xmlns:m="http://schemas.openxmlformats.org/officeDocument/2006/math">
+                    <m:sSub>
+                      <m:sSubPr>
+                        <m:ctrlPr>
+                          <a:rPr lang="en-US" b="0" i="1" smtClean="0">
+                            <a:latin typeface="Cambria Math" panose="02040503050406030204" pitchFamily="18" charset="0"/>
+                          </a:rPr>
+                        </m:ctrlPr>
+                      </m:sSubPr>
+                      <m:e>
+                        <m:r>
+                          <a:rPr lang="en-US" b="0" i="1" smtClean="0">
+                            <a:latin typeface="Cambria Math" panose="02040503050406030204" pitchFamily="18" charset="0"/>
+                          </a:rPr>
+                          <m:t>𝑠</m:t>
+                        </m:r>
+                      </m:e>
+                      <m:sub>
+                        <m:r>
+                          <a:rPr lang="en-US" b="0" i="1" smtClean="0">
+                            <a:latin typeface="Cambria Math" panose="02040503050406030204" pitchFamily="18" charset="0"/>
+                          </a:rPr>
+                          <m:t>𝑖</m:t>
+                        </m:r>
+                      </m:sub>
+                    </m:sSub>
+                  </m:oMath>
+                </a14:m>
+                <a:r>
+                  <a:rPr lang="en-US" dirty="0" smtClean="0"/>
                   <a:t> </a:t>
                 </a:r>
                 <a:r>
@@ -7927,7 +9368,7 @@
 </p:sld>
 </file>
 
-<file path=ppt/slides/slide7.xml><?xml version="1.0" encoding="utf-8"?>
+<file path=ppt/slides/slide9.xml><?xml version="1.0" encoding="utf-8"?>
 <p:sld xmlns:a="http://schemas.openxmlformats.org/drawingml/2006/main" xmlns:r="http://schemas.openxmlformats.org/officeDocument/2006/relationships" xmlns:p="http://schemas.openxmlformats.org/presentationml/2006/main">
   <p:cSld>
     <p:spTree>
@@ -9175,73 +10616,6 @@
     <p:extLst>
       <p:ext uri="{BB962C8B-B14F-4D97-AF65-F5344CB8AC3E}">
         <p14:creationId xmlns:p14="http://schemas.microsoft.com/office/powerpoint/2010/main" val="3765993190"/>
-      </p:ext>
-    </p:extLst>
-  </p:cSld>
-  <p:clrMapOvr>
-    <a:masterClrMapping/>
-  </p:clrMapOvr>
-</p:sld>
-</file>
-
-<file path=ppt/slides/slide8.xml><?xml version="1.0" encoding="utf-8"?>
-<p:sld xmlns:a="http://schemas.openxmlformats.org/drawingml/2006/main" xmlns:r="http://schemas.openxmlformats.org/officeDocument/2006/relationships" xmlns:p="http://schemas.openxmlformats.org/presentationml/2006/main">
-  <p:cSld>
-    <p:spTree>
-      <p:nvGrpSpPr>
-        <p:cNvPr id="1" name=""/>
-        <p:cNvGrpSpPr/>
-        <p:nvPr/>
-      </p:nvGrpSpPr>
-      <p:grpSpPr>
-        <a:xfrm>
-          <a:off x="0" y="0"/>
-          <a:ext cx="0" cy="0"/>
-          <a:chOff x="0" y="0"/>
-          <a:chExt cx="0" cy="0"/>
-        </a:xfrm>
-      </p:grpSpPr>
-      <p:sp>
-        <p:nvSpPr>
-          <p:cNvPr id="7" name="Title 6">
-            <a:extLst>
-              <a:ext uri="{FF2B5EF4-FFF2-40B4-BE49-F238E27FC236}">
-                <a16:creationId xmlns:a16="http://schemas.microsoft.com/office/drawing/2014/main" xmlns="" id="{8AB8EB34-892F-4494-9C40-44F74E78102D}"/>
-              </a:ext>
-            </a:extLst>
-          </p:cNvPr>
-          <p:cNvSpPr>
-            <a:spLocks noGrp="1"/>
-          </p:cNvSpPr>
-          <p:nvPr>
-            <p:ph type="title"/>
-          </p:nvPr>
-        </p:nvSpPr>
-        <p:spPr>
-          <a:xfrm>
-            <a:off x="838200" y="2766218"/>
-            <a:ext cx="10515600" cy="1325563"/>
-          </a:xfrm>
-        </p:spPr>
-        <p:txBody>
-          <a:bodyPr>
-            <a:normAutofit/>
-          </a:bodyPr>
-          <a:lstStyle/>
-          <a:p>
-            <a:pPr algn="ctr"/>
-            <a:r>
-              <a:rPr lang="en-US" sz="6600" b="1" dirty="0" err="1"/>
-              <a:t>Exemple</a:t>
-            </a:r>
-            <a:endParaRPr lang="en-US" sz="6600" b="1" dirty="0"/>
-          </a:p>
-        </p:txBody>
-      </p:sp>
-    </p:spTree>
-    <p:extLst>
-      <p:ext uri="{BB962C8B-B14F-4D97-AF65-F5344CB8AC3E}">
-        <p14:creationId xmlns:p14="http://schemas.microsoft.com/office/powerpoint/2010/main" val="3897564382"/>
       </p:ext>
     </p:extLst>
   </p:cSld>

</xml_diff>